<commit_message>
GHC poster, last edits
</commit_message>
<xml_diff>
--- a/2013-GHC-affinity-poster.pptx
+++ b/2013-GHC-affinity-poster.pptx
@@ -3474,7 +3474,7 @@
         <p:spPr>
           <a:xfrm>
             <a:off x="473719" y="6675297"/>
-            <a:ext cx="21031200" cy="9144000"/>
+            <a:ext cx="21031200" cy="9541072"/>
           </a:xfrm>
           <a:prstGeom prst="rect">
             <a:avLst/>
@@ -3537,7 +3537,15 @@
             </a:r>
             <a:r>
               <a:rPr lang="en-US" sz="4400" dirty="0"/>
-              <a:t>of data across multiple resources may result in situations where reactively co-locating data for compute operations may be expensive in terms of network bandwidth/latencies/</a:t>
+              <a:t>of data across multiple resources may result in situations where reactively co-locating data for compute operations may be expensive in terms of network </a:t>
+            </a:r>
+            <a:r>
+              <a:rPr lang="en-US" sz="4400" dirty="0" smtClean="0"/>
+              <a:t>bandwidth, latencies</a:t>
+            </a:r>
+            <a:r>
+              <a:rPr lang="en-US" sz="4400" dirty="0" smtClean="0"/>
+              <a:t>, </a:t>
             </a:r>
             <a:r>
               <a:rPr lang="en-US" sz="4400" dirty="0" smtClean="0"/>
@@ -3658,8 +3666,13 @@
             </a:pPr>
             <a:r>
               <a:rPr lang="en-US" sz="4400" dirty="0" smtClean="0"/>
-              <a:t>Three-pronged Approach</a:t>
-            </a:r>
+              <a:t>Three-pronged </a:t>
+            </a:r>
+            <a:r>
+              <a:rPr lang="en-US" sz="4400" dirty="0" smtClean="0"/>
+              <a:t>Developmental Approach</a:t>
+            </a:r>
+            <a:endParaRPr lang="en-US" sz="4400" dirty="0" smtClean="0"/>
           </a:p>
           <a:p>
             <a:pPr marL="3365312" lvl="1" indent="-857250">
@@ -3701,8 +3714,8 @@
         </p:nvSpPr>
         <p:spPr>
           <a:xfrm>
-            <a:off x="22401400" y="6716094"/>
-            <a:ext cx="21031200" cy="9144000"/>
+            <a:off x="22401400" y="6675297"/>
+            <a:ext cx="21031200" cy="9541072"/>
           </a:xfrm>
           <a:prstGeom prst="rect">
             <a:avLst/>
@@ -3748,7 +3761,11 @@
             </a:pPr>
             <a:r>
               <a:rPr lang="en-US" sz="4400" dirty="0" smtClean="0"/>
-              <a:t>Affinity aids in the decision making by taking into account factors that may not be available at the ‘scheduler’ level</a:t>
+              <a:t>Affinity aids in the decision making by taking into account factors that may not be available at the ‘scheduler’ </a:t>
+            </a:r>
+            <a:r>
+              <a:rPr lang="en-US" sz="4400" dirty="0" smtClean="0"/>
+              <a:t>level</a:t>
             </a:r>
           </a:p>
           <a:p>
@@ -3758,17 +3775,9 @@
             </a:pPr>
             <a:r>
               <a:rPr lang="en-US" sz="4400" dirty="0" smtClean="0"/>
-              <a:t>By predicting efficient placement at a high-level, there is less optimization delay at the scheduler level</a:t>
-            </a:r>
-          </a:p>
-          <a:p>
+              <a:t>As an abstraction, the application of affinity is not limited to compute-data relationships only (could use for data dispersion)</a:t>
+            </a:r>
             <a:endParaRPr lang="en-US" sz="4400" dirty="0" smtClean="0"/>
-          </a:p>
-          <a:p>
-            <a:r>
-              <a:rPr lang="en-US" sz="6000" b="1" dirty="0" smtClean="0"/>
-              <a:t>Benefits of Scheduling + Affinity</a:t>
-            </a:r>
           </a:p>
           <a:p>
             <a:pPr marL="857250" indent="-857250">
@@ -3777,7 +3786,18 @@
             </a:pPr>
             <a:r>
               <a:rPr lang="en-US" sz="4400" dirty="0" smtClean="0"/>
-              <a:t>Minimize data movement across networks or machines</a:t>
+              <a:t>By predicting efficient placement at a high-level, there is less optimization delay at the scheduler </a:t>
+            </a:r>
+            <a:r>
+              <a:rPr lang="en-US" sz="4400" dirty="0" smtClean="0"/>
+              <a:t>level</a:t>
+            </a:r>
+            <a:endParaRPr lang="en-US" sz="4400" dirty="0" smtClean="0"/>
+          </a:p>
+          <a:p>
+            <a:r>
+              <a:rPr lang="en-US" sz="6000" b="1" dirty="0" smtClean="0"/>
+              <a:t>Benefits of Scheduling + Affinity</a:t>
             </a:r>
           </a:p>
           <a:p>
@@ -3787,7 +3807,7 @@
             </a:pPr>
             <a:r>
               <a:rPr lang="en-US" sz="4400" dirty="0" smtClean="0"/>
-              <a:t>Move computation to large datasets when possible</a:t>
+              <a:t>Minimize data movement across networks or machines</a:t>
             </a:r>
           </a:p>
           <a:p>
@@ -3797,7 +3817,7 @@
             </a:pPr>
             <a:r>
               <a:rPr lang="en-US" sz="4400" dirty="0" smtClean="0"/>
-              <a:t>Maximize throughput, performance, or both</a:t>
+              <a:t>Move computation to large datasets when possible</a:t>
             </a:r>
           </a:p>
           <a:p>
@@ -3807,7 +3827,7 @@
             </a:pPr>
             <a:r>
               <a:rPr lang="en-US" sz="4400" dirty="0" smtClean="0"/>
-              <a:t>Preserve privacy and security of data when necessary</a:t>
+              <a:t>Maximize throughput, performance, or both</a:t>
             </a:r>
           </a:p>
           <a:p>
@@ -3815,7 +3835,15 @@
               <a:buFont typeface="Arial"/>
               <a:buChar char="•"/>
             </a:pPr>
-            <a:endParaRPr lang="en-US" sz="4400" dirty="0"/>
+            <a:r>
+              <a:rPr lang="en-US" sz="4400" dirty="0" smtClean="0"/>
+              <a:t>Preserve privacy and security of data when </a:t>
+            </a:r>
+            <a:r>
+              <a:rPr lang="en-US" sz="4400" dirty="0" smtClean="0"/>
+              <a:t>necessary</a:t>
+            </a:r>
+            <a:endParaRPr lang="en-US" sz="4400" dirty="0" smtClean="0"/>
           </a:p>
         </p:txBody>
       </p:sp>
@@ -3827,8 +3855,8 @@
         </p:nvSpPr>
         <p:spPr>
           <a:xfrm>
-            <a:off x="22401400" y="34633613"/>
-            <a:ext cx="21031200" cy="8617743"/>
+            <a:off x="22401400" y="33989974"/>
+            <a:ext cx="21031200" cy="9294851"/>
           </a:xfrm>
           <a:prstGeom prst="rect">
             <a:avLst/>
@@ -3897,7 +3925,19 @@
             </a:pPr>
             <a:r>
               <a:rPr lang="en-US" sz="4400" dirty="0" smtClean="0"/>
-              <a:t>Implement affinity algorithm into software with smart scheduling capabilities</a:t>
+              <a:t>Implement affinity algorithm into software with </a:t>
+            </a:r>
+            <a:r>
+              <a:rPr lang="en-US" sz="4400" dirty="0" smtClean="0"/>
+              <a:t>advanced</a:t>
+            </a:r>
+            <a:r>
+              <a:rPr lang="en-US" sz="4400" dirty="0" smtClean="0"/>
+              <a:t> </a:t>
+            </a:r>
+            <a:r>
+              <a:rPr lang="en-US" sz="4400" dirty="0" smtClean="0"/>
+              <a:t>scheduling capabilities</a:t>
             </a:r>
           </a:p>
           <a:p>
@@ -3930,12 +3970,40 @@
               <a:t>Demonstrate how </a:t>
             </a:r>
             <a:r>
+              <a:rPr lang="en-US" sz="4400" dirty="0" smtClean="0"/>
+              <a:t>the affinity abstraction </a:t>
+            </a:r>
+            <a:r>
               <a:rPr lang="en-US" sz="4400" dirty="0"/>
-              <a:t>affinity can provide an important tool for effective compute-data placement and scheduling</a:t>
-            </a:r>
-            <a:r>
-              <a:rPr lang="en-US" sz="4400" dirty="0" smtClean="0"/>
-              <a:t>.</a:t>
+              <a:t>can </a:t>
+            </a:r>
+            <a:r>
+              <a:rPr lang="en-US" sz="4400" dirty="0" smtClean="0"/>
+              <a:t>be implemented in </a:t>
+            </a:r>
+            <a:r>
+              <a:rPr lang="en-US" sz="4400" dirty="0" smtClean="0"/>
+              <a:t>existing</a:t>
+            </a:r>
+            <a:r>
+              <a:rPr lang="en-US" sz="4400" dirty="0" smtClean="0"/>
+              <a:t> </a:t>
+            </a:r>
+            <a:r>
+              <a:rPr lang="en-US" sz="4400" dirty="0" err="1" smtClean="0"/>
+              <a:t>cyberinfrastructure</a:t>
+            </a:r>
+            <a:r>
+              <a:rPr lang="en-US" sz="4400" dirty="0" smtClean="0"/>
+              <a:t> to provide an </a:t>
+            </a:r>
+            <a:r>
+              <a:rPr lang="en-US" sz="4400" dirty="0"/>
+              <a:t>important tool for effective compute-data placement and scheduling</a:t>
+            </a:r>
+            <a:r>
+              <a:rPr lang="en-US" sz="4400" dirty="0" smtClean="0"/>
+              <a:t>. </a:t>
             </a:r>
             <a:endParaRPr lang="en-US" sz="4400" dirty="0"/>
           </a:p>
@@ -4137,7 +4205,15 @@
             </a:r>
             <a:r>
               <a:rPr lang="en-US" sz="4400" dirty="0" smtClean="0"/>
-              <a:t>: uses locality hints and tries to assign tasks to machines with local copies of data to be operated on</a:t>
+              <a:t>: </a:t>
+            </a:r>
+            <a:r>
+              <a:rPr lang="en-US" sz="4400" dirty="0" smtClean="0"/>
+              <a:t>Uses </a:t>
+            </a:r>
+            <a:r>
+              <a:rPr lang="en-US" sz="4400" dirty="0" smtClean="0"/>
+              <a:t>locality hints and tries to assign tasks to machines with local copies of data to be operated on</a:t>
             </a:r>
           </a:p>
           <a:p>
@@ -4158,8 +4234,16 @@
               <a:t> </a:t>
             </a:r>
             <a:r>
-              <a:rPr lang="en-US" sz="4400" dirty="0" smtClean="0"/>
-              <a:t>offers an affinity group for geographic locality of cloud deployments and storage</a:t>
+              <a:rPr lang="en-US" sz="4400" dirty="0"/>
+              <a:t>O</a:t>
+            </a:r>
+            <a:r>
+              <a:rPr lang="en-US" sz="4400" dirty="0" smtClean="0"/>
+              <a:t>ffers </a:t>
+            </a:r>
+            <a:r>
+              <a:rPr lang="en-US" sz="4400" dirty="0" smtClean="0"/>
+              <a:t>an affinity group for geographic locality of cloud deployments and storage</a:t>
             </a:r>
             <a:endParaRPr lang="en-US" sz="4400" b="1" i="1" dirty="0" smtClean="0"/>
           </a:p>
@@ -4178,7 +4262,15 @@
             </a:r>
             <a:r>
               <a:rPr lang="en-US" sz="4400" dirty="0"/>
-              <a:t> middleware that operates on large scientific datasets; processes distributed data through a series of individualized processes</a:t>
+              <a:t> </a:t>
+            </a:r>
+            <a:r>
+              <a:rPr lang="en-US" sz="4400" dirty="0" smtClean="0"/>
+              <a:t>Middleware </a:t>
+            </a:r>
+            <a:r>
+              <a:rPr lang="en-US" sz="4400" dirty="0"/>
+              <a:t>that operates on large scientific datasets; processes distributed data through a series of individualized processes</a:t>
             </a:r>
           </a:p>
           <a:p>
@@ -4196,12 +4288,21 @@
             </a:r>
             <a:r>
               <a:rPr lang="en-US" sz="4400" dirty="0"/>
-              <a:t> allows for processing distributed data at a localized level via micro-services; allows for localized computation of distributed data on clients by replication via multiple distributed </a:t>
-            </a:r>
-            <a:r>
-              <a:rPr lang="en-US" sz="4400" dirty="0" smtClean="0"/>
-              <a:t>sets</a:t>
-            </a:r>
+              <a:t> </a:t>
+            </a:r>
+            <a:r>
+              <a:rPr lang="en-US" sz="4400" dirty="0" smtClean="0"/>
+              <a:t>Allows </a:t>
+            </a:r>
+            <a:r>
+              <a:rPr lang="en-US" sz="4400" dirty="0"/>
+              <a:t>for processing distributed data at a localized level via micro-services; allows for localized computation of distributed data on clients by replication via multiple </a:t>
+            </a:r>
+            <a:r>
+              <a:rPr lang="en-US" sz="4400" dirty="0" smtClean="0"/>
+              <a:t>distributed datasets</a:t>
+            </a:r>
+            <a:endParaRPr lang="en-US" sz="4400" dirty="0" smtClean="0"/>
           </a:p>
           <a:p>
             <a:pPr marL="857250" indent="-857250">
@@ -4218,7 +4319,15 @@
             </a:r>
             <a:r>
               <a:rPr lang="en-US" sz="4400" dirty="0"/>
-              <a:t>group data into units, and aggregate files together based on their usage; static assignment of data-data </a:t>
+              <a:t>G</a:t>
+            </a:r>
+            <a:r>
+              <a:rPr lang="en-US" sz="4400" dirty="0" smtClean="0"/>
+              <a:t>roup </a:t>
+            </a:r>
+            <a:r>
+              <a:rPr lang="en-US" sz="4400" dirty="0"/>
+              <a:t>data into units, and aggregate files together based on their usage; static assignment of data-data </a:t>
             </a:r>
             <a:r>
               <a:rPr lang="en-US" sz="4400" dirty="0" smtClean="0"/>
@@ -4237,7 +4346,7 @@
         <p:spPr>
           <a:xfrm>
             <a:off x="21904438" y="16964455"/>
-            <a:ext cx="0" cy="17270543"/>
+            <a:ext cx="0" cy="16519559"/>
           </a:xfrm>
           <a:prstGeom prst="line">
             <a:avLst/>
@@ -4274,7 +4383,7 @@
         </p:blipFill>
         <p:spPr>
           <a:xfrm>
-            <a:off x="24672650" y="15584319"/>
+            <a:off x="25931347" y="16357703"/>
             <a:ext cx="14919603" cy="12601995"/>
           </a:xfrm>
           <a:prstGeom prst="rect">
@@ -4318,23 +4427,7 @@
             </a:r>
             <a:r>
               <a:rPr lang="en-US" sz="3600" dirty="0" smtClean="0"/>
-              <a:t>. A user first defines his or her application, including executable, environment variables, input data, etc. This application description is used to generate a dependency matrix between all tasks and their input data. The affinity engine takes this matrix, along with data from information services (file transfer times, geographic location, </a:t>
-            </a:r>
-            <a:r>
-              <a:rPr lang="en-US" sz="3600" dirty="0" err="1" smtClean="0"/>
-              <a:t>etc</a:t>
-            </a:r>
-            <a:r>
-              <a:rPr lang="en-US" sz="3600" dirty="0" smtClean="0"/>
-              <a:t>) to generate affinity values between tasks and data. A larger affinity value indicates to the scheduler that it is advantageous to schedule these tasks/data together. An affinity-aware scheduler is then able to accept this affinity matrix and utilize it to aid in the placement </a:t>
-            </a:r>
-            <a:r>
-              <a:rPr lang="en-US" sz="3600" dirty="0" err="1" smtClean="0"/>
-              <a:t>desicion</a:t>
-            </a:r>
-            <a:r>
-              <a:rPr lang="en-US" sz="3600" dirty="0" smtClean="0"/>
-              <a:t>-making process. Note that affinity is just one of what could be many inputs that the scheduler may utilize for optimizing placement.</a:t>
+              <a:t>. A user first defines his or her application, including executable, environment variables, input data, etc. This application description is used to generate a dependency matrix between all tasks and their input data. The affinity engine takes this matrix, along with data from information services (file transfer times, geographic location, etc.) to generate affinity values between tasks and data. A larger affinity value indicates to the scheduler that it is advantageous to schedule these tasks/data together. An affinity-aware scheduler is then able to accept this affinity matrix and utilize it to aid in the placement decision-making process. Note that affinity is just one of what could be many inputs that the scheduler may utilize for optimizing placement.</a:t>
             </a:r>
             <a:endParaRPr lang="en-US" sz="3600" dirty="0" smtClean="0"/>
           </a:p>

</xml_diff>